<commit_message>
Added a new project to the list of projects. Fixed more alignment issues
</commit_message>
<xml_diff>
--- a/images/For building custom images.pptx
+++ b/images/For building custom images.pptx
@@ -107,6 +107,11 @@
       </a:defRPr>
     </a:lvl9pPr>
   </p:defaultTextStyle>
+  <p:extLst>
+    <p:ext uri="{EFAFB233-063F-42B5-8137-9DF3F51BA10A}">
+      <p15:sldGuideLst xmlns:p15="http://schemas.microsoft.com/office/powerpoint/2012/main"/>
+    </p:ext>
+  </p:extLst>
 </p:presentation>
 </file>
 
@@ -241,7 +246,7 @@
           <a:p>
             <a:fld id="{1E6A9F28-98A6-4C15-BB2E-6DCFC97FCA36}" type="datetimeFigureOut">
               <a:rPr lang="en-SG" smtClean="0"/>
-              <a:t>1/1/2020</a:t>
+              <a:t>6/1/2020</a:t>
             </a:fld>
             <a:endParaRPr lang="en-SG"/>
           </a:p>
@@ -411,7 +416,7 @@
           <a:p>
             <a:fld id="{1E6A9F28-98A6-4C15-BB2E-6DCFC97FCA36}" type="datetimeFigureOut">
               <a:rPr lang="en-SG" smtClean="0"/>
-              <a:t>1/1/2020</a:t>
+              <a:t>6/1/2020</a:t>
             </a:fld>
             <a:endParaRPr lang="en-SG"/>
           </a:p>
@@ -591,7 +596,7 @@
           <a:p>
             <a:fld id="{1E6A9F28-98A6-4C15-BB2E-6DCFC97FCA36}" type="datetimeFigureOut">
               <a:rPr lang="en-SG" smtClean="0"/>
-              <a:t>1/1/2020</a:t>
+              <a:t>6/1/2020</a:t>
             </a:fld>
             <a:endParaRPr lang="en-SG"/>
           </a:p>
@@ -761,7 +766,7 @@
           <a:p>
             <a:fld id="{1E6A9F28-98A6-4C15-BB2E-6DCFC97FCA36}" type="datetimeFigureOut">
               <a:rPr lang="en-SG" smtClean="0"/>
-              <a:t>1/1/2020</a:t>
+              <a:t>6/1/2020</a:t>
             </a:fld>
             <a:endParaRPr lang="en-SG"/>
           </a:p>
@@ -1007,7 +1012,7 @@
           <a:p>
             <a:fld id="{1E6A9F28-98A6-4C15-BB2E-6DCFC97FCA36}" type="datetimeFigureOut">
               <a:rPr lang="en-SG" smtClean="0"/>
-              <a:t>1/1/2020</a:t>
+              <a:t>6/1/2020</a:t>
             </a:fld>
             <a:endParaRPr lang="en-SG"/>
           </a:p>
@@ -1239,7 +1244,7 @@
           <a:p>
             <a:fld id="{1E6A9F28-98A6-4C15-BB2E-6DCFC97FCA36}" type="datetimeFigureOut">
               <a:rPr lang="en-SG" smtClean="0"/>
-              <a:t>1/1/2020</a:t>
+              <a:t>6/1/2020</a:t>
             </a:fld>
             <a:endParaRPr lang="en-SG"/>
           </a:p>
@@ -1606,7 +1611,7 @@
           <a:p>
             <a:fld id="{1E6A9F28-98A6-4C15-BB2E-6DCFC97FCA36}" type="datetimeFigureOut">
               <a:rPr lang="en-SG" smtClean="0"/>
-              <a:t>1/1/2020</a:t>
+              <a:t>6/1/2020</a:t>
             </a:fld>
             <a:endParaRPr lang="en-SG"/>
           </a:p>
@@ -1724,7 +1729,7 @@
           <a:p>
             <a:fld id="{1E6A9F28-98A6-4C15-BB2E-6DCFC97FCA36}" type="datetimeFigureOut">
               <a:rPr lang="en-SG" smtClean="0"/>
-              <a:t>1/1/2020</a:t>
+              <a:t>6/1/2020</a:t>
             </a:fld>
             <a:endParaRPr lang="en-SG"/>
           </a:p>
@@ -1819,7 +1824,7 @@
           <a:p>
             <a:fld id="{1E6A9F28-98A6-4C15-BB2E-6DCFC97FCA36}" type="datetimeFigureOut">
               <a:rPr lang="en-SG" smtClean="0"/>
-              <a:t>1/1/2020</a:t>
+              <a:t>6/1/2020</a:t>
             </a:fld>
             <a:endParaRPr lang="en-SG"/>
           </a:p>
@@ -2096,7 +2101,7 @@
           <a:p>
             <a:fld id="{1E6A9F28-98A6-4C15-BB2E-6DCFC97FCA36}" type="datetimeFigureOut">
               <a:rPr lang="en-SG" smtClean="0"/>
-              <a:t>1/1/2020</a:t>
+              <a:t>6/1/2020</a:t>
             </a:fld>
             <a:endParaRPr lang="en-SG"/>
           </a:p>
@@ -2349,7 +2354,7 @@
           <a:p>
             <a:fld id="{1E6A9F28-98A6-4C15-BB2E-6DCFC97FCA36}" type="datetimeFigureOut">
               <a:rPr lang="en-SG" smtClean="0"/>
-              <a:t>1/1/2020</a:t>
+              <a:t>6/1/2020</a:t>
             </a:fld>
             <a:endParaRPr lang="en-SG"/>
           </a:p>
@@ -2562,7 +2567,7 @@
           <a:p>
             <a:fld id="{1E6A9F28-98A6-4C15-BB2E-6DCFC97FCA36}" type="datetimeFigureOut">
               <a:rPr lang="en-SG" smtClean="0"/>
-              <a:t>1/1/2020</a:t>
+              <a:t>6/1/2020</a:t>
             </a:fld>
             <a:endParaRPr lang="en-SG"/>
           </a:p>
@@ -3711,236 +3716,30 @@
           <a:chExt cx="0" cy="0"/>
         </a:xfrm>
       </p:grpSpPr>
-      <p:sp>
-        <p:nvSpPr>
-          <p:cNvPr id="5" name="Cube 4"/>
-          <p:cNvSpPr/>
+      <p:pic>
+        <p:nvPicPr>
+          <p:cNvPr id="2" name="Picture 1"/>
+          <p:cNvPicPr>
+            <a:picLocks noChangeAspect="1"/>
+          </p:cNvPicPr>
           <p:nvPr/>
-        </p:nvSpPr>
+        </p:nvPicPr>
+        <p:blipFill>
+          <a:blip r:embed="rId2"/>
+          <a:stretch>
+            <a:fillRect/>
+          </a:stretch>
+        </p:blipFill>
         <p:spPr>
           <a:xfrm>
-            <a:off x="4210497" y="5161788"/>
-            <a:ext cx="1014984" cy="1014984"/>
+            <a:off x="-1" y="0"/>
+            <a:ext cx="12192001" cy="6858000"/>
           </a:xfrm>
-          <a:prstGeom prst="cube">
+          <a:prstGeom prst="rect">
             <a:avLst/>
           </a:prstGeom>
-          <a:solidFill>
-            <a:srgbClr val="FF0000"/>
-          </a:solidFill>
-          <a:ln>
-            <a:noFill/>
-          </a:ln>
         </p:spPr>
-        <p:style>
-          <a:lnRef idx="2">
-            <a:schemeClr val="accent1">
-              <a:shade val="50000"/>
-            </a:schemeClr>
-          </a:lnRef>
-          <a:fillRef idx="1">
-            <a:schemeClr val="accent1"/>
-          </a:fillRef>
-          <a:effectRef idx="0">
-            <a:schemeClr val="accent1"/>
-          </a:effectRef>
-          <a:fontRef idx="minor">
-            <a:schemeClr val="lt1"/>
-          </a:fontRef>
-        </p:style>
-        <p:txBody>
-          <a:bodyPr rtlCol="0" anchor="ctr"/>
-          <a:lstStyle/>
-          <a:p>
-            <a:pPr algn="ctr"/>
-            <a:endParaRPr lang="en-SG"/>
-          </a:p>
-        </p:txBody>
-      </p:sp>
-      <p:sp>
-        <p:nvSpPr>
-          <p:cNvPr id="6" name="Cube 5"/>
-          <p:cNvSpPr/>
-          <p:nvPr/>
-        </p:nvSpPr>
-        <p:spPr>
-          <a:xfrm>
-            <a:off x="4953298" y="4489704"/>
-            <a:ext cx="1014984" cy="1014984"/>
-          </a:xfrm>
-          <a:prstGeom prst="cube">
-            <a:avLst/>
-          </a:prstGeom>
-          <a:solidFill>
-            <a:srgbClr val="FFC000"/>
-          </a:solidFill>
-          <a:ln>
-            <a:noFill/>
-          </a:ln>
-        </p:spPr>
-        <p:style>
-          <a:lnRef idx="2">
-            <a:schemeClr val="accent1">
-              <a:shade val="50000"/>
-            </a:schemeClr>
-          </a:lnRef>
-          <a:fillRef idx="1">
-            <a:schemeClr val="accent1"/>
-          </a:fillRef>
-          <a:effectRef idx="0">
-            <a:schemeClr val="accent1"/>
-          </a:effectRef>
-          <a:fontRef idx="minor">
-            <a:schemeClr val="lt1"/>
-          </a:fontRef>
-        </p:style>
-        <p:txBody>
-          <a:bodyPr rtlCol="0" anchor="ctr"/>
-          <a:lstStyle/>
-          <a:p>
-            <a:pPr algn="ctr"/>
-            <a:endParaRPr lang="en-SG"/>
-          </a:p>
-        </p:txBody>
-      </p:sp>
-      <p:sp>
-        <p:nvSpPr>
-          <p:cNvPr id="7" name="Cube 6"/>
-          <p:cNvSpPr/>
-          <p:nvPr/>
-        </p:nvSpPr>
-        <p:spPr>
-          <a:xfrm>
-            <a:off x="5460790" y="5161788"/>
-            <a:ext cx="1014984" cy="1014984"/>
-          </a:xfrm>
-          <a:prstGeom prst="cube">
-            <a:avLst/>
-          </a:prstGeom>
-          <a:solidFill>
-            <a:srgbClr val="92D050"/>
-          </a:solidFill>
-          <a:ln>
-            <a:noFill/>
-          </a:ln>
-        </p:spPr>
-        <p:style>
-          <a:lnRef idx="2">
-            <a:schemeClr val="accent1">
-              <a:shade val="50000"/>
-            </a:schemeClr>
-          </a:lnRef>
-          <a:fillRef idx="1">
-            <a:schemeClr val="accent1"/>
-          </a:fillRef>
-          <a:effectRef idx="0">
-            <a:schemeClr val="accent1"/>
-          </a:effectRef>
-          <a:fontRef idx="minor">
-            <a:schemeClr val="lt1"/>
-          </a:fontRef>
-        </p:style>
-        <p:txBody>
-          <a:bodyPr rtlCol="0" anchor="ctr"/>
-          <a:lstStyle/>
-          <a:p>
-            <a:pPr algn="ctr"/>
-            <a:endParaRPr lang="en-SG"/>
-          </a:p>
-        </p:txBody>
-      </p:sp>
-      <p:sp>
-        <p:nvSpPr>
-          <p:cNvPr id="8" name="Cube 7"/>
-          <p:cNvSpPr/>
-          <p:nvPr/>
-        </p:nvSpPr>
-        <p:spPr>
-          <a:xfrm>
-            <a:off x="6203591" y="4489704"/>
-            <a:ext cx="1014984" cy="1014984"/>
-          </a:xfrm>
-          <a:prstGeom prst="cube">
-            <a:avLst/>
-          </a:prstGeom>
-          <a:solidFill>
-            <a:schemeClr val="accent1"/>
-          </a:solidFill>
-          <a:ln>
-            <a:noFill/>
-          </a:ln>
-        </p:spPr>
-        <p:style>
-          <a:lnRef idx="2">
-            <a:schemeClr val="accent1">
-              <a:shade val="50000"/>
-            </a:schemeClr>
-          </a:lnRef>
-          <a:fillRef idx="1">
-            <a:schemeClr val="accent1"/>
-          </a:fillRef>
-          <a:effectRef idx="0">
-            <a:schemeClr val="accent1"/>
-          </a:effectRef>
-          <a:fontRef idx="minor">
-            <a:schemeClr val="lt1"/>
-          </a:fontRef>
-        </p:style>
-        <p:txBody>
-          <a:bodyPr rtlCol="0" anchor="ctr"/>
-          <a:lstStyle/>
-          <a:p>
-            <a:pPr algn="ctr"/>
-            <a:endParaRPr lang="en-SG"/>
-          </a:p>
-        </p:txBody>
-      </p:sp>
-      <p:sp>
-        <p:nvSpPr>
-          <p:cNvPr id="9" name="Cube 8"/>
-          <p:cNvSpPr/>
-          <p:nvPr/>
-        </p:nvSpPr>
-        <p:spPr>
-          <a:xfrm>
-            <a:off x="6946392" y="5161788"/>
-            <a:ext cx="1014984" cy="1014984"/>
-          </a:xfrm>
-          <a:prstGeom prst="cube">
-            <a:avLst/>
-          </a:prstGeom>
-          <a:solidFill>
-            <a:srgbClr val="7030A0"/>
-          </a:solidFill>
-          <a:ln>
-            <a:noFill/>
-          </a:ln>
-        </p:spPr>
-        <p:style>
-          <a:lnRef idx="2">
-            <a:schemeClr val="accent1">
-              <a:shade val="50000"/>
-            </a:schemeClr>
-          </a:lnRef>
-          <a:fillRef idx="1">
-            <a:schemeClr val="accent1"/>
-          </a:fillRef>
-          <a:effectRef idx="0">
-            <a:schemeClr val="accent1"/>
-          </a:effectRef>
-          <a:fontRef idx="minor">
-            <a:schemeClr val="lt1"/>
-          </a:fontRef>
-        </p:style>
-        <p:txBody>
-          <a:bodyPr rtlCol="0" anchor="ctr"/>
-          <a:lstStyle/>
-          <a:p>
-            <a:pPr algn="ctr"/>
-            <a:endParaRPr lang="en-SG"/>
-          </a:p>
-        </p:txBody>
-      </p:sp>
+      </p:pic>
     </p:spTree>
     <p:extLst>
       <p:ext uri="{BB962C8B-B14F-4D97-AF65-F5344CB8AC3E}">

</xml_diff>

<commit_message>
Added a browser tab icon
</commit_message>
<xml_diff>
--- a/images/For building custom images.pptx
+++ b/images/For building custom images.pptx
@@ -9,6 +9,7 @@
     <p:sldId id="257" r:id="rId3"/>
     <p:sldId id="259" r:id="rId4"/>
     <p:sldId id="258" r:id="rId5"/>
+    <p:sldId id="260" r:id="rId6"/>
   </p:sldIdLst>
   <p:sldSz cx="12192000" cy="6858000"/>
   <p:notesSz cx="6858000" cy="9144000"/>
@@ -3696,6 +3697,13 @@
   <p:clrMapOvr>
     <a:masterClrMapping/>
   </p:clrMapOvr>
+  <p:timing>
+    <p:tnLst>
+      <p:par>
+        <p:cTn id="1" dur="indefinite" restart="never" nodeType="tmRoot"/>
+      </p:par>
+    </p:tnLst>
+  </p:timing>
 </p:sld>
 </file>
 
@@ -3750,6 +3758,104 @@
   <p:clrMapOvr>
     <a:masterClrMapping/>
   </p:clrMapOvr>
+  <p:timing>
+    <p:tnLst>
+      <p:par>
+        <p:cTn id="1" dur="indefinite" restart="never" nodeType="tmRoot"/>
+      </p:par>
+    </p:tnLst>
+  </p:timing>
+</p:sld>
+</file>
+
+<file path=ppt/slides/slide5.xml><?xml version="1.0" encoding="utf-8"?>
+<p:sld xmlns:a="http://schemas.openxmlformats.org/drawingml/2006/main" xmlns:r="http://schemas.openxmlformats.org/officeDocument/2006/relationships" xmlns:p="http://schemas.openxmlformats.org/presentationml/2006/main">
+  <p:cSld>
+    <p:spTree>
+      <p:nvGrpSpPr>
+        <p:cNvPr id="1" name=""/>
+        <p:cNvGrpSpPr/>
+        <p:nvPr/>
+      </p:nvGrpSpPr>
+      <p:grpSpPr>
+        <a:xfrm>
+          <a:off x="0" y="0"/>
+          <a:ext cx="0" cy="0"/>
+          <a:chOff x="0" y="0"/>
+          <a:chExt cx="0" cy="0"/>
+        </a:xfrm>
+      </p:grpSpPr>
+      <p:sp>
+        <p:nvSpPr>
+          <p:cNvPr id="3" name="Rectangle 2"/>
+          <p:cNvSpPr/>
+          <p:nvPr/>
+        </p:nvSpPr>
+        <p:spPr>
+          <a:xfrm>
+            <a:off x="2688336" y="0"/>
+            <a:ext cx="6858000" cy="6858000"/>
+          </a:xfrm>
+          <a:prstGeom prst="rect">
+            <a:avLst/>
+          </a:prstGeom>
+          <a:solidFill>
+            <a:srgbClr val="22A39F"/>
+          </a:solidFill>
+          <a:ln>
+            <a:noFill/>
+          </a:ln>
+        </p:spPr>
+        <p:style>
+          <a:lnRef idx="2">
+            <a:schemeClr val="accent1">
+              <a:shade val="50000"/>
+            </a:schemeClr>
+          </a:lnRef>
+          <a:fillRef idx="1">
+            <a:schemeClr val="accent1"/>
+          </a:fillRef>
+          <a:effectRef idx="0">
+            <a:schemeClr val="accent1"/>
+          </a:effectRef>
+          <a:fontRef idx="minor">
+            <a:schemeClr val="lt1"/>
+          </a:fontRef>
+        </p:style>
+        <p:txBody>
+          <a:bodyPr rtlCol="0" anchor="ctr"/>
+          <a:lstStyle/>
+          <a:p>
+            <a:pPr algn="ctr"/>
+            <a:r>
+              <a:rPr lang="en-SG" sz="34400" smtClean="0">
+                <a:latin typeface="+mj-lt"/>
+              </a:rPr>
+              <a:t>DH</a:t>
+            </a:r>
+            <a:endParaRPr lang="en-SG" sz="34400">
+              <a:latin typeface="+mj-lt"/>
+            </a:endParaRPr>
+          </a:p>
+        </p:txBody>
+      </p:sp>
+    </p:spTree>
+    <p:extLst>
+      <p:ext uri="{BB962C8B-B14F-4D97-AF65-F5344CB8AC3E}">
+        <p14:creationId xmlns:p14="http://schemas.microsoft.com/office/powerpoint/2010/main" val="1518880562"/>
+      </p:ext>
+    </p:extLst>
+  </p:cSld>
+  <p:clrMapOvr>
+    <a:masterClrMapping/>
+  </p:clrMapOvr>
+  <p:timing>
+    <p:tnLst>
+      <p:par>
+        <p:cTn id="1" dur="indefinite" restart="never" nodeType="tmRoot"/>
+      </p:par>
+    </p:tnLst>
+  </p:timing>
 </p:sld>
 </file>
 

</xml_diff>